<commit_message>
presentation updated (no video)
</commit_message>
<xml_diff>
--- a/presentation.pptx
+++ b/presentation.pptx
@@ -19,8 +19,9 @@
     <p:sldId id="270" r:id="rId13"/>
     <p:sldId id="271" r:id="rId14"/>
     <p:sldId id="272" r:id="rId15"/>
-    <p:sldId id="263" r:id="rId16"/>
-    <p:sldId id="268" r:id="rId17"/>
+    <p:sldId id="273" r:id="rId16"/>
+    <p:sldId id="263" r:id="rId17"/>
+    <p:sldId id="268" r:id="rId18"/>
   </p:sldIdLst>
   <p:sldSz cx="12192000" cy="6858000"/>
   <p:notesSz cx="6858000" cy="9144000"/>
@@ -274,7 +275,7 @@
           <a:p>
             <a:fld id="{C4398B16-2979-4210-8032-D30A6CFBC287}" type="datetimeFigureOut">
               <a:rPr lang="ru-RU" smtClean="0"/>
-              <a:t>15.05.2024</a:t>
+              <a:t>16.05.2024</a:t>
             </a:fld>
             <a:endParaRPr lang="ru-RU"/>
           </a:p>
@@ -472,7 +473,7 @@
           <a:p>
             <a:fld id="{C4398B16-2979-4210-8032-D30A6CFBC287}" type="datetimeFigureOut">
               <a:rPr lang="ru-RU" smtClean="0"/>
-              <a:t>15.05.2024</a:t>
+              <a:t>16.05.2024</a:t>
             </a:fld>
             <a:endParaRPr lang="ru-RU"/>
           </a:p>
@@ -680,7 +681,7 @@
           <a:p>
             <a:fld id="{C4398B16-2979-4210-8032-D30A6CFBC287}" type="datetimeFigureOut">
               <a:rPr lang="ru-RU" smtClean="0"/>
-              <a:t>15.05.2024</a:t>
+              <a:t>16.05.2024</a:t>
             </a:fld>
             <a:endParaRPr lang="ru-RU"/>
           </a:p>
@@ -878,7 +879,7 @@
           <a:p>
             <a:fld id="{C4398B16-2979-4210-8032-D30A6CFBC287}" type="datetimeFigureOut">
               <a:rPr lang="ru-RU" smtClean="0"/>
-              <a:t>15.05.2024</a:t>
+              <a:t>16.05.2024</a:t>
             </a:fld>
             <a:endParaRPr lang="ru-RU"/>
           </a:p>
@@ -1153,7 +1154,7 @@
           <a:p>
             <a:fld id="{C4398B16-2979-4210-8032-D30A6CFBC287}" type="datetimeFigureOut">
               <a:rPr lang="ru-RU" smtClean="0"/>
-              <a:t>15.05.2024</a:t>
+              <a:t>16.05.2024</a:t>
             </a:fld>
             <a:endParaRPr lang="ru-RU"/>
           </a:p>
@@ -1418,7 +1419,7 @@
           <a:p>
             <a:fld id="{C4398B16-2979-4210-8032-D30A6CFBC287}" type="datetimeFigureOut">
               <a:rPr lang="ru-RU" smtClean="0"/>
-              <a:t>15.05.2024</a:t>
+              <a:t>16.05.2024</a:t>
             </a:fld>
             <a:endParaRPr lang="ru-RU"/>
           </a:p>
@@ -1830,7 +1831,7 @@
           <a:p>
             <a:fld id="{C4398B16-2979-4210-8032-D30A6CFBC287}" type="datetimeFigureOut">
               <a:rPr lang="ru-RU" smtClean="0"/>
-              <a:t>15.05.2024</a:t>
+              <a:t>16.05.2024</a:t>
             </a:fld>
             <a:endParaRPr lang="ru-RU"/>
           </a:p>
@@ -1971,7 +1972,7 @@
           <a:p>
             <a:fld id="{C4398B16-2979-4210-8032-D30A6CFBC287}" type="datetimeFigureOut">
               <a:rPr lang="ru-RU" smtClean="0"/>
-              <a:t>15.05.2024</a:t>
+              <a:t>16.05.2024</a:t>
             </a:fld>
             <a:endParaRPr lang="ru-RU"/>
           </a:p>
@@ -2084,7 +2085,7 @@
           <a:p>
             <a:fld id="{C4398B16-2979-4210-8032-D30A6CFBC287}" type="datetimeFigureOut">
               <a:rPr lang="ru-RU" smtClean="0"/>
-              <a:t>15.05.2024</a:t>
+              <a:t>16.05.2024</a:t>
             </a:fld>
             <a:endParaRPr lang="ru-RU"/>
           </a:p>
@@ -2395,7 +2396,7 @@
           <a:p>
             <a:fld id="{C4398B16-2979-4210-8032-D30A6CFBC287}" type="datetimeFigureOut">
               <a:rPr lang="ru-RU" smtClean="0"/>
-              <a:t>15.05.2024</a:t>
+              <a:t>16.05.2024</a:t>
             </a:fld>
             <a:endParaRPr lang="ru-RU"/>
           </a:p>
@@ -2683,7 +2684,7 @@
           <a:p>
             <a:fld id="{C4398B16-2979-4210-8032-D30A6CFBC287}" type="datetimeFigureOut">
               <a:rPr lang="ru-RU" smtClean="0"/>
-              <a:t>15.05.2024</a:t>
+              <a:t>16.05.2024</a:t>
             </a:fld>
             <a:endParaRPr lang="ru-RU"/>
           </a:p>
@@ -2924,7 +2925,7 @@
           <a:p>
             <a:fld id="{C4398B16-2979-4210-8032-D30A6CFBC287}" type="datetimeFigureOut">
               <a:rPr lang="ru-RU" smtClean="0"/>
-              <a:t>15.05.2024</a:t>
+              <a:t>16.05.2024</a:t>
             </a:fld>
             <a:endParaRPr lang="ru-RU"/>
           </a:p>
@@ -3359,21 +3360,21 @@
         </p:nvSpPr>
         <p:spPr>
           <a:xfrm>
-            <a:off x="1524000" y="1519928"/>
+            <a:off x="1524000" y="1041400"/>
             <a:ext cx="9144000" cy="2387600"/>
           </a:xfrm>
         </p:spPr>
         <p:txBody>
           <a:bodyPr>
-            <a:normAutofit fontScale="90000"/>
+            <a:noAutofit/>
           </a:bodyPr>
           <a:lstStyle/>
           <a:p>
             <a:r>
-              <a:rPr lang="ru-RU" dirty="0">
+              <a:rPr lang="ru-RU" sz="4400" dirty="0">
                 <a:latin typeface="Impact" panose="020B0806030902050204" pitchFamily="34" charset="0"/>
               </a:rPr>
-              <a:t>Программная Реализация Математической Модели Для Модуля Имитатора Отраженного Сигнала</a:t>
+              <a:t>Программная Реализация Радиолокационной Станции Включающей Модуль Имитатора Отраженного Сигнала</a:t>
             </a:r>
           </a:p>
         </p:txBody>
@@ -3499,7 +3500,9 @@
           <a:lstStyle/>
           <a:p>
             <a:r>
-              <a:rPr lang="ru-RU" dirty="0"/>
+              <a:rPr lang="ru-RU" dirty="0">
+                <a:latin typeface="Impact" panose="020B0806030902050204" pitchFamily="34" charset="0"/>
+              </a:rPr>
               <a:t>Реализация</a:t>
             </a:r>
           </a:p>
@@ -3617,9 +3620,12 @@
           <a:lstStyle/>
           <a:p>
             <a:r>
-              <a:rPr lang="ru-RU" dirty="0"/>
+              <a:rPr lang="ru-RU" dirty="0">
+                <a:latin typeface="Impact" panose="020B0806030902050204" pitchFamily="34" charset="0"/>
+              </a:rPr>
               <a:t>Реализация</a:t>
             </a:r>
+            <a:endParaRPr lang="ru-RU" dirty="0"/>
           </a:p>
         </p:txBody>
       </p:sp>
@@ -3735,9 +3741,12 @@
           <a:lstStyle/>
           <a:p>
             <a:r>
-              <a:rPr lang="ru-RU" dirty="0"/>
+              <a:rPr lang="ru-RU" dirty="0">
+                <a:latin typeface="Impact" panose="020B0806030902050204" pitchFamily="34" charset="0"/>
+              </a:rPr>
               <a:t>Реализация</a:t>
             </a:r>
+            <a:endParaRPr lang="ru-RU" dirty="0"/>
           </a:p>
         </p:txBody>
       </p:sp>
@@ -3853,9 +3862,12 @@
           <a:lstStyle/>
           <a:p>
             <a:r>
-              <a:rPr lang="ru-RU" dirty="0"/>
+              <a:rPr lang="ru-RU" dirty="0">
+                <a:latin typeface="Impact" panose="020B0806030902050204" pitchFamily="34" charset="0"/>
+              </a:rPr>
               <a:t>Реализация</a:t>
             </a:r>
+            <a:endParaRPr lang="ru-RU" dirty="0"/>
           </a:p>
         </p:txBody>
       </p:sp>
@@ -3971,9 +3983,12 @@
           <a:lstStyle/>
           <a:p>
             <a:r>
-              <a:rPr lang="ru-RU" dirty="0"/>
+              <a:rPr lang="ru-RU" dirty="0">
+                <a:latin typeface="Impact" panose="020B0806030902050204" pitchFamily="34" charset="0"/>
+              </a:rPr>
               <a:t>Реализация</a:t>
             </a:r>
+            <a:endParaRPr lang="ru-RU" dirty="0"/>
           </a:p>
         </p:txBody>
       </p:sp>
@@ -4042,6 +4057,102 @@
           <p:cNvPr id="2" name="Заголовок 1">
             <a:extLst>
               <a:ext uri="{FF2B5EF4-FFF2-40B4-BE49-F238E27FC236}">
+                <a16:creationId xmlns:a16="http://schemas.microsoft.com/office/drawing/2014/main" id="{8F1AC807-42BA-4180-A1A0-981EEC89EDA5}"/>
+              </a:ext>
+            </a:extLst>
+          </p:cNvPr>
+          <p:cNvSpPr>
+            <a:spLocks noGrp="1"/>
+          </p:cNvSpPr>
+          <p:nvPr>
+            <p:ph type="title"/>
+          </p:nvPr>
+        </p:nvSpPr>
+        <p:spPr/>
+        <p:txBody>
+          <a:bodyPr/>
+          <a:lstStyle/>
+          <a:p>
+            <a:r>
+              <a:rPr lang="ru-RU" dirty="0">
+                <a:latin typeface="Impact" panose="020B0806030902050204" pitchFamily="34" charset="0"/>
+              </a:rPr>
+              <a:t>Реализация</a:t>
+            </a:r>
+            <a:endParaRPr lang="ru-RU" dirty="0"/>
+          </a:p>
+        </p:txBody>
+      </p:sp>
+      <p:sp>
+        <p:nvSpPr>
+          <p:cNvPr id="3" name="TextBox 2">
+            <a:extLst>
+              <a:ext uri="{FF2B5EF4-FFF2-40B4-BE49-F238E27FC236}">
+                <a16:creationId xmlns:a16="http://schemas.microsoft.com/office/drawing/2014/main" id="{9203F55A-29D8-4085-A9D9-C4C26551BDE9}"/>
+              </a:ext>
+            </a:extLst>
+          </p:cNvPr>
+          <p:cNvSpPr txBox="1"/>
+          <p:nvPr/>
+        </p:nvSpPr>
+        <p:spPr>
+          <a:xfrm>
+            <a:off x="1804946" y="2568271"/>
+            <a:ext cx="1057524" cy="369332"/>
+          </a:xfrm>
+          <a:prstGeom prst="rect">
+            <a:avLst/>
+          </a:prstGeom>
+          <a:noFill/>
+        </p:spPr>
+        <p:txBody>
+          <a:bodyPr wrap="square" rtlCol="0">
+            <a:spAutoFit/>
+          </a:bodyPr>
+          <a:lstStyle/>
+          <a:p>
+            <a:r>
+              <a:rPr lang="ru-RU" dirty="0"/>
+              <a:t>видео</a:t>
+            </a:r>
+          </a:p>
+        </p:txBody>
+      </p:sp>
+    </p:spTree>
+    <p:extLst>
+      <p:ext uri="{BB962C8B-B14F-4D97-AF65-F5344CB8AC3E}">
+        <p14:creationId xmlns:p14="http://schemas.microsoft.com/office/powerpoint/2010/main" val="4072341842"/>
+      </p:ext>
+    </p:extLst>
+  </p:cSld>
+  <p:clrMapOvr>
+    <a:masterClrMapping/>
+  </p:clrMapOvr>
+</p:sld>
+</file>
+
+<file path=ppt/slides/slide16.xml><?xml version="1.0" encoding="utf-8"?>
+<p:sld xmlns:a="http://schemas.openxmlformats.org/drawingml/2006/main" xmlns:r="http://schemas.openxmlformats.org/officeDocument/2006/relationships" xmlns:p="http://schemas.openxmlformats.org/presentationml/2006/main">
+  <p:cSld>
+    <p:spTree>
+      <p:nvGrpSpPr>
+        <p:cNvPr id="1" name=""/>
+        <p:cNvGrpSpPr/>
+        <p:nvPr/>
+      </p:nvGrpSpPr>
+      <p:grpSpPr>
+        <a:xfrm>
+          <a:off x="0" y="0"/>
+          <a:ext cx="0" cy="0"/>
+          <a:chOff x="0" y="0"/>
+          <a:chExt cx="0" cy="0"/>
+        </a:xfrm>
+      </p:grpSpPr>
+      <p:sp>
+        <p:nvSpPr>
+          <p:cNvPr id="2" name="Заголовок 1">
+            <a:extLst>
+              <a:ext uri="{FF2B5EF4-FFF2-40B4-BE49-F238E27FC236}">
                 <a16:creationId xmlns:a16="http://schemas.microsoft.com/office/drawing/2014/main" id="{8E636C34-9CE8-442C-B15B-6869C25D88EF}"/>
               </a:ext>
             </a:extLst>
@@ -4059,49 +4170,57 @@
           <a:lstStyle/>
           <a:p>
             <a:r>
+              <a:rPr lang="ru-RU" dirty="0">
+                <a:latin typeface="Impact" panose="020B0806030902050204" pitchFamily="34" charset="0"/>
+              </a:rPr>
+              <a:t>Реализация</a:t>
+            </a:r>
+            <a:endParaRPr lang="ru-RU" dirty="0"/>
+          </a:p>
+        </p:txBody>
+      </p:sp>
+      <p:sp>
+        <p:nvSpPr>
+          <p:cNvPr id="3" name="Объект 2">
+            <a:extLst>
+              <a:ext uri="{FF2B5EF4-FFF2-40B4-BE49-F238E27FC236}">
+                <a16:creationId xmlns:a16="http://schemas.microsoft.com/office/drawing/2014/main" id="{5643F895-1AC5-44D7-938F-4E3C9D06BE4F}"/>
+              </a:ext>
+            </a:extLst>
+          </p:cNvPr>
+          <p:cNvSpPr>
+            <a:spLocks noGrp="1"/>
+          </p:cNvSpPr>
+          <p:nvPr>
+            <p:ph idx="1"/>
+          </p:nvPr>
+        </p:nvSpPr>
+        <p:spPr>
+          <a:xfrm>
+            <a:off x="838199" y="1825625"/>
+            <a:ext cx="10556019" cy="4351338"/>
+          </a:xfrm>
+        </p:spPr>
+        <p:txBody>
+          <a:bodyPr/>
+          <a:lstStyle/>
+          <a:p>
+            <a:r>
               <a:rPr lang="ru-RU" dirty="0"/>
-              <a:t>Итоги</a:t>
-            </a:r>
-          </a:p>
-        </p:txBody>
-      </p:sp>
-      <p:sp>
-        <p:nvSpPr>
-          <p:cNvPr id="3" name="Объект 2">
-            <a:extLst>
-              <a:ext uri="{FF2B5EF4-FFF2-40B4-BE49-F238E27FC236}">
-                <a16:creationId xmlns:a16="http://schemas.microsoft.com/office/drawing/2014/main" id="{5643F895-1AC5-44D7-938F-4E3C9D06BE4F}"/>
-              </a:ext>
-            </a:extLst>
-          </p:cNvPr>
-          <p:cNvSpPr>
-            <a:spLocks noGrp="1"/>
-          </p:cNvSpPr>
-          <p:nvPr>
-            <p:ph idx="1"/>
-          </p:nvPr>
-        </p:nvSpPr>
-        <p:spPr/>
-        <p:txBody>
-          <a:bodyPr/>
-          <a:lstStyle/>
+              <a:t>Разработана система моделирования, включающая РЛС, модуль отраженного сигнала, модуль управления перемещением объекта</a:t>
+            </a:r>
+          </a:p>
           <a:p>
             <a:r>
               <a:rPr lang="ru-RU" dirty="0"/>
-              <a:t>Разработан симулятор отражения сигнала</a:t>
-            </a:r>
-          </a:p>
-          <a:p>
-            <a:r>
-              <a:rPr lang="ru-RU" dirty="0"/>
-              <a:t>Реализован вывод графика результата моделирования</a:t>
-            </a:r>
-          </a:p>
-          <a:p>
-            <a:r>
-              <a:rPr lang="ru-RU" dirty="0"/>
-              <a:t>Разработан графический интерфейс для визуализации моделирования</a:t>
-            </a:r>
+              <a:t>Разработан графический интерфейс для настройки параметров моделирования и визуализации результатов</a:t>
+            </a:r>
+          </a:p>
+          <a:p>
+            <a:pPr marL="0" indent="0">
+              <a:buNone/>
+            </a:pPr>
+            <a:endParaRPr lang="ru-RU" dirty="0"/>
           </a:p>
           <a:p>
             <a:pPr marL="0" indent="0">
@@ -4144,7 +4263,7 @@
 </p:sld>
 </file>
 
-<file path=ppt/slides/slide16.xml><?xml version="1.0" encoding="utf-8"?>
+<file path=ppt/slides/slide17.xml><?xml version="1.0" encoding="utf-8"?>
 <p:sld xmlns:a="http://schemas.openxmlformats.org/drawingml/2006/main" xmlns:r="http://schemas.openxmlformats.org/officeDocument/2006/relationships" xmlns:p="http://schemas.openxmlformats.org/presentationml/2006/main">
   <p:cSld>
     <p:spTree>
@@ -4250,7 +4369,9 @@
           <a:lstStyle/>
           <a:p>
             <a:r>
-              <a:rPr lang="ru-RU" dirty="0"/>
+              <a:rPr lang="ru-RU" dirty="0">
+                <a:latin typeface="Impact" panose="020B0806030902050204" pitchFamily="34" charset="0"/>
+              </a:rPr>
               <a:t>План</a:t>
             </a:r>
           </a:p>
@@ -4285,25 +4406,30 @@
           <a:p>
             <a:r>
               <a:rPr lang="ru-RU" dirty="0"/>
-              <a:t>Цель </a:t>
+              <a:t>Постановка задачи </a:t>
             </a:r>
           </a:p>
           <a:p>
             <a:r>
               <a:rPr lang="ru-RU" dirty="0"/>
-              <a:t>Задачи</a:t>
+              <a:t>Описание модели</a:t>
             </a:r>
           </a:p>
           <a:p>
             <a:r>
               <a:rPr lang="ru-RU" dirty="0"/>
-              <a:t>Теория</a:t>
-            </a:r>
-          </a:p>
-          <a:p>
+              <a:t>Технологии</a:t>
+            </a:r>
+            <a:endParaRPr lang="en-US" dirty="0"/>
+          </a:p>
+          <a:p>
+            <a:r>
+              <a:rPr lang="en-US" dirty="0"/>
+              <a:t>UML-</a:t>
+            </a:r>
             <a:r>
               <a:rPr lang="ru-RU" dirty="0"/>
-              <a:t>Стек</a:t>
+              <a:t>диаграмма</a:t>
             </a:r>
           </a:p>
           <a:p>
@@ -4378,80 +4504,326 @@
           <a:lstStyle/>
           <a:p>
             <a:r>
-              <a:rPr lang="ru-RU" dirty="0"/>
+              <a:rPr lang="ru-RU" dirty="0">
+                <a:latin typeface="Impact" panose="020B0806030902050204" pitchFamily="34" charset="0"/>
+              </a:rPr>
               <a:t>Команда</a:t>
             </a:r>
           </a:p>
         </p:txBody>
       </p:sp>
-      <p:sp>
-        <p:nvSpPr>
-          <p:cNvPr id="3" name="Объект 2">
-            <a:extLst>
-              <a:ext uri="{FF2B5EF4-FFF2-40B4-BE49-F238E27FC236}">
-                <a16:creationId xmlns:a16="http://schemas.microsoft.com/office/drawing/2014/main" id="{A945FAFF-6FE0-40CB-9493-D476F4D10E2D}"/>
-              </a:ext>
-            </a:extLst>
-          </p:cNvPr>
-          <p:cNvSpPr>
-            <a:spLocks noGrp="1"/>
-          </p:cNvSpPr>
-          <p:nvPr>
-            <p:ph idx="1"/>
-          </p:nvPr>
-        </p:nvSpPr>
-        <p:spPr/>
-        <p:txBody>
-          <a:bodyPr/>
-          <a:lstStyle/>
-          <a:p>
-            <a:r>
-              <a:rPr lang="ru-RU" dirty="0"/>
-              <a:t>Рябчиков Михаил</a:t>
-            </a:r>
-            <a:r>
-              <a:rPr lang="en-US" dirty="0"/>
-              <a:t>: </a:t>
-            </a:r>
-            <a:r>
-              <a:rPr lang="ru-RU" dirty="0"/>
-              <a:t>математическая модель</a:t>
-            </a:r>
-          </a:p>
-          <a:p>
-            <a:r>
-              <a:rPr lang="ru-RU" dirty="0" err="1"/>
-              <a:t>Фазлыев</a:t>
-            </a:r>
-            <a:r>
-              <a:rPr lang="ru-RU" dirty="0"/>
-              <a:t> Нияз</a:t>
-            </a:r>
-            <a:r>
-              <a:rPr lang="en-US" dirty="0"/>
-              <a:t>: </a:t>
-            </a:r>
-            <a:r>
-              <a:rPr lang="ru-RU" dirty="0"/>
-              <a:t>бэкенд, математическая модель</a:t>
-            </a:r>
-          </a:p>
-          <a:p>
-            <a:r>
-              <a:rPr lang="ru-RU" dirty="0"/>
-              <a:t>Чижикова Ярослава</a:t>
-            </a:r>
-            <a:r>
-              <a:rPr lang="en-US" dirty="0"/>
-              <a:t>: </a:t>
-            </a:r>
-            <a:r>
-              <a:rPr lang="ru-RU" dirty="0"/>
-              <a:t>графический интерфейс</a:t>
-            </a:r>
-          </a:p>
-        </p:txBody>
-      </p:sp>
+      <p:graphicFrame>
+        <p:nvGraphicFramePr>
+          <p:cNvPr id="5" name="Таблица 5">
+            <a:extLst>
+              <a:ext uri="{FF2B5EF4-FFF2-40B4-BE49-F238E27FC236}">
+                <a16:creationId xmlns:a16="http://schemas.microsoft.com/office/drawing/2014/main" id="{11AECDA5-6F18-4363-A62E-ADE5C6D53A12}"/>
+              </a:ext>
+            </a:extLst>
+          </p:cNvPr>
+          <p:cNvGraphicFramePr>
+            <a:graphicFrameLocks noGrp="1"/>
+          </p:cNvGraphicFramePr>
+          <p:nvPr>
+            <p:extLst>
+              <p:ext uri="{D42A27DB-BD31-4B8C-83A1-F6EECF244321}">
+                <p14:modId xmlns:p14="http://schemas.microsoft.com/office/powerpoint/2010/main" val="3389004846"/>
+              </p:ext>
+            </p:extLst>
+          </p:nvPr>
+        </p:nvGraphicFramePr>
+        <p:xfrm>
+          <a:off x="1358678" y="2266158"/>
+          <a:ext cx="9474643" cy="2325684"/>
+        </p:xfrm>
+        <a:graphic>
+          <a:graphicData uri="http://schemas.openxmlformats.org/drawingml/2006/table">
+            <a:tbl>
+              <a:tblPr firstRow="1" bandRow="1">
+                <a:tableStyleId>{5C22544A-7EE6-4342-B048-85BDC9FD1C3A}</a:tableStyleId>
+              </a:tblPr>
+              <a:tblGrid>
+                <a:gridCol w="2488945">
+                  <a:extLst>
+                    <a:ext uri="{9D8B030D-6E8A-4147-A177-3AD203B41FA5}">
+                      <a16:colId xmlns:a16="http://schemas.microsoft.com/office/drawing/2014/main" val="2796252650"/>
+                    </a:ext>
+                  </a:extLst>
+                </a:gridCol>
+                <a:gridCol w="2328566">
+                  <a:extLst>
+                    <a:ext uri="{9D8B030D-6E8A-4147-A177-3AD203B41FA5}">
+                      <a16:colId xmlns:a16="http://schemas.microsoft.com/office/drawing/2014/main" val="1556816508"/>
+                    </a:ext>
+                  </a:extLst>
+                </a:gridCol>
+                <a:gridCol w="2328566">
+                  <a:extLst>
+                    <a:ext uri="{9D8B030D-6E8A-4147-A177-3AD203B41FA5}">
+                      <a16:colId xmlns:a16="http://schemas.microsoft.com/office/drawing/2014/main" val="3977899856"/>
+                    </a:ext>
+                  </a:extLst>
+                </a:gridCol>
+                <a:gridCol w="2328566">
+                  <a:extLst>
+                    <a:ext uri="{9D8B030D-6E8A-4147-A177-3AD203B41FA5}">
+                      <a16:colId xmlns:a16="http://schemas.microsoft.com/office/drawing/2014/main" val="2467082677"/>
+                    </a:ext>
+                  </a:extLst>
+                </a:gridCol>
+              </a:tblGrid>
+              <a:tr h="581421">
+                <a:tc>
+                  <a:txBody>
+                    <a:bodyPr/>
+                    <a:lstStyle/>
+                    <a:p>
+                      <a:pPr algn="ctr"/>
+                      <a:r>
+                        <a:rPr lang="ru-RU" sz="2000" dirty="0"/>
+                        <a:t>Член команды</a:t>
+                      </a:r>
+                    </a:p>
+                  </a:txBody>
+                  <a:tcPr/>
+                </a:tc>
+                <a:tc>
+                  <a:txBody>
+                    <a:bodyPr/>
+                    <a:lstStyle/>
+                    <a:p>
+                      <a:pPr algn="ctr"/>
+                      <a:r>
+                        <a:rPr lang="ru-RU" sz="2000" dirty="0"/>
+                        <a:t>Мат. модель</a:t>
+                      </a:r>
+                    </a:p>
+                  </a:txBody>
+                  <a:tcPr/>
+                </a:tc>
+                <a:tc>
+                  <a:txBody>
+                    <a:bodyPr/>
+                    <a:lstStyle/>
+                    <a:p>
+                      <a:pPr algn="ctr"/>
+                      <a:r>
+                        <a:rPr lang="ru-RU" sz="2000" dirty="0"/>
+                        <a:t>Бэкенд</a:t>
+                      </a:r>
+                    </a:p>
+                  </a:txBody>
+                  <a:tcPr/>
+                </a:tc>
+                <a:tc>
+                  <a:txBody>
+                    <a:bodyPr/>
+                    <a:lstStyle/>
+                    <a:p>
+                      <a:pPr algn="ctr"/>
+                      <a:r>
+                        <a:rPr lang="ru-RU" sz="2000" dirty="0" err="1"/>
+                        <a:t>Фронтенд</a:t>
+                      </a:r>
+                      <a:endParaRPr lang="ru-RU" sz="2000" dirty="0"/>
+                    </a:p>
+                  </a:txBody>
+                  <a:tcPr/>
+                </a:tc>
+                <a:extLst>
+                  <a:ext uri="{0D108BD9-81ED-4DB2-BD59-A6C34878D82A}">
+                    <a16:rowId xmlns:a16="http://schemas.microsoft.com/office/drawing/2014/main" val="2218301122"/>
+                  </a:ext>
+                </a:extLst>
+              </a:tr>
+              <a:tr h="581421">
+                <a:tc>
+                  <a:txBody>
+                    <a:bodyPr/>
+                    <a:lstStyle/>
+                    <a:p>
+                      <a:pPr algn="ctr"/>
+                      <a:r>
+                        <a:rPr lang="ru-RU" sz="2000" dirty="0"/>
+                        <a:t>Рябчиков Михаил</a:t>
+                      </a:r>
+                    </a:p>
+                  </a:txBody>
+                  <a:tcPr/>
+                </a:tc>
+                <a:tc>
+                  <a:txBody>
+                    <a:bodyPr/>
+                    <a:lstStyle/>
+                    <a:p>
+                      <a:pPr algn="ctr"/>
+                      <a:r>
+                        <a:rPr lang="ru-RU" sz="2800" b="1" dirty="0"/>
+                        <a:t>+</a:t>
+                      </a:r>
+                    </a:p>
+                  </a:txBody>
+                  <a:tcPr/>
+                </a:tc>
+                <a:tc>
+                  <a:txBody>
+                    <a:bodyPr/>
+                    <a:lstStyle/>
+                    <a:p>
+                      <a:pPr algn="ctr"/>
+                      <a:r>
+                        <a:rPr lang="ru-RU" sz="2800" b="1" dirty="0"/>
+                        <a:t>+</a:t>
+                      </a:r>
+                    </a:p>
+                  </a:txBody>
+                  <a:tcPr/>
+                </a:tc>
+                <a:tc>
+                  <a:txBody>
+                    <a:bodyPr/>
+                    <a:lstStyle/>
+                    <a:p>
+                      <a:pPr algn="ctr"/>
+                      <a:endParaRPr lang="ru-RU" sz="2000"/>
+                    </a:p>
+                  </a:txBody>
+                  <a:tcPr/>
+                </a:tc>
+                <a:extLst>
+                  <a:ext uri="{0D108BD9-81ED-4DB2-BD59-A6C34878D82A}">
+                    <a16:rowId xmlns:a16="http://schemas.microsoft.com/office/drawing/2014/main" val="2325383161"/>
+                  </a:ext>
+                </a:extLst>
+              </a:tr>
+              <a:tr h="581421">
+                <a:tc>
+                  <a:txBody>
+                    <a:bodyPr/>
+                    <a:lstStyle/>
+                    <a:p>
+                      <a:pPr algn="ctr"/>
+                      <a:r>
+                        <a:rPr lang="ru-RU" sz="2000" dirty="0" err="1"/>
+                        <a:t>Фазлыев</a:t>
+                      </a:r>
+                      <a:r>
+                        <a:rPr lang="ru-RU" sz="2000" dirty="0"/>
+                        <a:t> Нияз</a:t>
+                      </a:r>
+                    </a:p>
+                  </a:txBody>
+                  <a:tcPr/>
+                </a:tc>
+                <a:tc>
+                  <a:txBody>
+                    <a:bodyPr/>
+                    <a:lstStyle/>
+                    <a:p>
+                      <a:pPr algn="ctr"/>
+                      <a:r>
+                        <a:rPr lang="ru-RU" sz="2800" b="1" dirty="0"/>
+                        <a:t>+</a:t>
+                      </a:r>
+                    </a:p>
+                  </a:txBody>
+                  <a:tcPr/>
+                </a:tc>
+                <a:tc>
+                  <a:txBody>
+                    <a:bodyPr/>
+                    <a:lstStyle/>
+                    <a:p>
+                      <a:pPr algn="ctr"/>
+                      <a:r>
+                        <a:rPr lang="ru-RU" sz="2800" b="1" dirty="0"/>
+                        <a:t>+</a:t>
+                      </a:r>
+                    </a:p>
+                  </a:txBody>
+                  <a:tcPr/>
+                </a:tc>
+                <a:tc>
+                  <a:txBody>
+                    <a:bodyPr/>
+                    <a:lstStyle/>
+                    <a:p>
+                      <a:pPr algn="ctr"/>
+                      <a:endParaRPr lang="ru-RU" sz="2000"/>
+                    </a:p>
+                  </a:txBody>
+                  <a:tcPr/>
+                </a:tc>
+                <a:extLst>
+                  <a:ext uri="{0D108BD9-81ED-4DB2-BD59-A6C34878D82A}">
+                    <a16:rowId xmlns:a16="http://schemas.microsoft.com/office/drawing/2014/main" val="754895741"/>
+                  </a:ext>
+                </a:extLst>
+              </a:tr>
+              <a:tr h="581421">
+                <a:tc>
+                  <a:txBody>
+                    <a:bodyPr/>
+                    <a:lstStyle/>
+                    <a:p>
+                      <a:pPr algn="ctr"/>
+                      <a:r>
+                        <a:rPr lang="ru-RU" sz="2000" dirty="0"/>
+                        <a:t>Чижикова Ярослава</a:t>
+                      </a:r>
+                    </a:p>
+                  </a:txBody>
+                  <a:tcPr/>
+                </a:tc>
+                <a:tc>
+                  <a:txBody>
+                    <a:bodyPr/>
+                    <a:lstStyle/>
+                    <a:p>
+                      <a:pPr algn="ctr"/>
+                      <a:endParaRPr lang="ru-RU" sz="2000"/>
+                    </a:p>
+                  </a:txBody>
+                  <a:tcPr/>
+                </a:tc>
+                <a:tc>
+                  <a:txBody>
+                    <a:bodyPr/>
+                    <a:lstStyle/>
+                    <a:p>
+                      <a:pPr algn="ctr"/>
+                      <a:r>
+                        <a:rPr lang="ru-RU" sz="2800" b="1" dirty="0"/>
+                        <a:t>+</a:t>
+                      </a:r>
+                    </a:p>
+                  </a:txBody>
+                  <a:tcPr/>
+                </a:tc>
+                <a:tc>
+                  <a:txBody>
+                    <a:bodyPr/>
+                    <a:lstStyle/>
+                    <a:p>
+                      <a:pPr algn="ctr"/>
+                      <a:r>
+                        <a:rPr lang="ru-RU" sz="2800" b="1" dirty="0"/>
+                        <a:t>+</a:t>
+                      </a:r>
+                    </a:p>
+                  </a:txBody>
+                  <a:tcPr/>
+                </a:tc>
+                <a:extLst>
+                  <a:ext uri="{0D108BD9-81ED-4DB2-BD59-A6C34878D82A}">
+                    <a16:rowId xmlns:a16="http://schemas.microsoft.com/office/drawing/2014/main" val="856956874"/>
+                  </a:ext>
+                </a:extLst>
+              </a:tr>
+            </a:tbl>
+          </a:graphicData>
+        </a:graphic>
+      </p:graphicFrame>
     </p:spTree>
     <p:extLst>
       <p:ext uri="{BB962C8B-B14F-4D97-AF65-F5344CB8AC3E}">
@@ -4504,7 +4876,9 @@
           <a:lstStyle/>
           <a:p>
             <a:r>
-              <a:rPr lang="ru-RU" dirty="0"/>
+              <a:rPr lang="ru-RU" dirty="0">
+                <a:latin typeface="Impact" panose="020B0806030902050204" pitchFamily="34" charset="0"/>
+              </a:rPr>
               <a:t>Цель</a:t>
             </a:r>
           </a:p>
@@ -4590,7 +4964,9 @@
           <a:lstStyle/>
           <a:p>
             <a:r>
-              <a:rPr lang="ru-RU" dirty="0"/>
+              <a:rPr lang="ru-RU" dirty="0">
+                <a:latin typeface="Impact" panose="020B0806030902050204" pitchFamily="34" charset="0"/>
+              </a:rPr>
               <a:t>Задачи</a:t>
             </a:r>
           </a:p>
@@ -4614,7 +4990,9 @@
         </p:nvSpPr>
         <p:spPr/>
         <p:txBody>
-          <a:bodyPr/>
+          <a:bodyPr>
+            <a:normAutofit lnSpcReduction="10000"/>
+          </a:bodyPr>
           <a:lstStyle/>
           <a:p>
             <a:pPr marL="514350" indent="-514350">
@@ -4692,7 +5070,25 @@
             </a:pPr>
             <a:r>
               <a:rPr lang="ru-RU" dirty="0"/>
-              <a:t>4</a:t>
+              <a:t>4. Тестирование</a:t>
+            </a:r>
+          </a:p>
+          <a:p>
+            <a:pPr marL="0" indent="0">
+              <a:buNone/>
+            </a:pPr>
+            <a:r>
+              <a:rPr lang="ru-RU" dirty="0"/>
+              <a:t>5. Документация</a:t>
+            </a:r>
+          </a:p>
+          <a:p>
+            <a:pPr marL="0" indent="0">
+              <a:buNone/>
+            </a:pPr>
+            <a:r>
+              <a:rPr lang="ru-RU" dirty="0"/>
+              <a:t>6. Презентация</a:t>
             </a:r>
             <a:endParaRPr lang="en-US" dirty="0"/>
           </a:p>
@@ -4750,8 +5146,10 @@
           <a:lstStyle/>
           <a:p>
             <a:r>
-              <a:rPr lang="ru-RU" dirty="0"/>
-              <a:t>Теория</a:t>
+              <a:rPr lang="ru-RU" dirty="0">
+                <a:latin typeface="Impact" panose="020B0806030902050204" pitchFamily="34" charset="0"/>
+              </a:rPr>
+              <a:t>Описание Модели</a:t>
             </a:r>
           </a:p>
         </p:txBody>
@@ -5204,8 +5602,10 @@
           <a:lstStyle/>
           <a:p>
             <a:r>
-              <a:rPr lang="ru-RU" dirty="0"/>
-              <a:t>Теория</a:t>
+              <a:rPr lang="ru-RU" dirty="0">
+                <a:latin typeface="Impact" panose="020B0806030902050204" pitchFamily="34" charset="0"/>
+              </a:rPr>
+              <a:t>Описание Модели</a:t>
             </a:r>
           </a:p>
         </p:txBody>
@@ -5438,50 +5838,206 @@
           <a:lstStyle/>
           <a:p>
             <a:r>
-              <a:rPr lang="ru-RU" dirty="0"/>
-              <a:t>Стек</a:t>
-            </a:r>
-          </a:p>
-        </p:txBody>
-      </p:sp>
-      <p:sp>
-        <p:nvSpPr>
-          <p:cNvPr id="3" name="Объект 2">
-            <a:extLst>
-              <a:ext uri="{FF2B5EF4-FFF2-40B4-BE49-F238E27FC236}">
-                <a16:creationId xmlns:a16="http://schemas.microsoft.com/office/drawing/2014/main" id="{86DD1E0D-59B5-421C-A0D0-FB28B267C881}"/>
-              </a:ext>
-            </a:extLst>
-          </p:cNvPr>
-          <p:cNvSpPr>
-            <a:spLocks noGrp="1"/>
-          </p:cNvSpPr>
-          <p:nvPr>
-            <p:ph idx="1"/>
-          </p:nvPr>
-        </p:nvSpPr>
-        <p:spPr/>
-        <p:txBody>
-          <a:bodyPr/>
-          <a:lstStyle/>
-          <a:p>
-            <a:r>
-              <a:rPr lang="ru-RU" dirty="0"/>
+              <a:rPr lang="ru-RU" dirty="0">
+                <a:latin typeface="Impact" panose="020B0806030902050204" pitchFamily="34" charset="0"/>
+              </a:rPr>
+              <a:t>Технологии</a:t>
+            </a:r>
+          </a:p>
+        </p:txBody>
+      </p:sp>
+      <p:sp>
+        <p:nvSpPr>
+          <p:cNvPr id="4" name="Прямоугольник: скругленные углы 3">
+            <a:extLst>
+              <a:ext uri="{FF2B5EF4-FFF2-40B4-BE49-F238E27FC236}">
+                <a16:creationId xmlns:a16="http://schemas.microsoft.com/office/drawing/2014/main" id="{570BBCAF-ACA2-4634-B69C-0897FD6A29F4}"/>
+              </a:ext>
+            </a:extLst>
+          </p:cNvPr>
+          <p:cNvSpPr/>
+          <p:nvPr/>
+        </p:nvSpPr>
+        <p:spPr>
+          <a:xfrm>
+            <a:off x="2353586" y="2737236"/>
+            <a:ext cx="2792233" cy="1383527"/>
+          </a:xfrm>
+          <a:prstGeom prst="roundRect">
+            <a:avLst/>
+          </a:prstGeom>
+        </p:spPr>
+        <p:style>
+          <a:lnRef idx="2">
+            <a:schemeClr val="accent1">
+              <a:shade val="50000"/>
+            </a:schemeClr>
+          </a:lnRef>
+          <a:fillRef idx="1">
+            <a:schemeClr val="accent1"/>
+          </a:fillRef>
+          <a:effectRef idx="0">
+            <a:schemeClr val="accent1"/>
+          </a:effectRef>
+          <a:fontRef idx="minor">
+            <a:schemeClr val="lt1"/>
+          </a:fontRef>
+        </p:style>
+        <p:txBody>
+          <a:bodyPr rtlCol="0" anchor="ctr"/>
+          <a:lstStyle/>
+          <a:p>
+            <a:pPr algn="ctr"/>
+            <a:r>
+              <a:rPr lang="ru-RU" sz="3600" dirty="0"/>
               <a:t>С++</a:t>
             </a:r>
           </a:p>
-          <a:p>
-            <a:r>
-              <a:rPr lang="en-US" dirty="0" err="1"/>
+        </p:txBody>
+      </p:sp>
+      <p:sp>
+        <p:nvSpPr>
+          <p:cNvPr id="5" name="Прямоугольник: скругленные углы 4">
+            <a:extLst>
+              <a:ext uri="{FF2B5EF4-FFF2-40B4-BE49-F238E27FC236}">
+                <a16:creationId xmlns:a16="http://schemas.microsoft.com/office/drawing/2014/main" id="{74B5C42A-AD47-46D1-8460-F68E36494505}"/>
+              </a:ext>
+            </a:extLst>
+          </p:cNvPr>
+          <p:cNvSpPr/>
+          <p:nvPr/>
+        </p:nvSpPr>
+        <p:spPr>
+          <a:xfrm>
+            <a:off x="6194067" y="1762414"/>
+            <a:ext cx="2792233" cy="1383527"/>
+          </a:xfrm>
+          <a:prstGeom prst="roundRect">
+            <a:avLst/>
+          </a:prstGeom>
+        </p:spPr>
+        <p:style>
+          <a:lnRef idx="2">
+            <a:schemeClr val="accent1">
+              <a:shade val="50000"/>
+            </a:schemeClr>
+          </a:lnRef>
+          <a:fillRef idx="1">
+            <a:schemeClr val="accent1"/>
+          </a:fillRef>
+          <a:effectRef idx="0">
+            <a:schemeClr val="accent1"/>
+          </a:effectRef>
+          <a:fontRef idx="minor">
+            <a:schemeClr val="lt1"/>
+          </a:fontRef>
+        </p:style>
+        <p:txBody>
+          <a:bodyPr rtlCol="0" anchor="ctr"/>
+          <a:lstStyle/>
+          <a:p>
+            <a:pPr algn="ctr"/>
+            <a:r>
+              <a:rPr lang="en-US" sz="4000" dirty="0" err="1"/>
               <a:t>Qt6</a:t>
             </a:r>
-            <a:endParaRPr lang="en-US" dirty="0"/>
-          </a:p>
-          <a:p>
-            <a:endParaRPr lang="ru-RU" dirty="0"/>
-          </a:p>
-        </p:txBody>
-      </p:sp>
+            <a:endParaRPr lang="ru-RU" sz="4000" dirty="0"/>
+          </a:p>
+        </p:txBody>
+      </p:sp>
+      <p:sp>
+        <p:nvSpPr>
+          <p:cNvPr id="6" name="Прямоугольник: скругленные углы 5">
+            <a:extLst>
+              <a:ext uri="{FF2B5EF4-FFF2-40B4-BE49-F238E27FC236}">
+                <a16:creationId xmlns:a16="http://schemas.microsoft.com/office/drawing/2014/main" id="{C6A62AB7-2CE0-40E1-A606-CA437CC4CD18}"/>
+              </a:ext>
+            </a:extLst>
+          </p:cNvPr>
+          <p:cNvSpPr/>
+          <p:nvPr/>
+        </p:nvSpPr>
+        <p:spPr>
+          <a:xfrm>
+            <a:off x="6194066" y="3712060"/>
+            <a:ext cx="2792233" cy="1383527"/>
+          </a:xfrm>
+          <a:prstGeom prst="roundRect">
+            <a:avLst/>
+          </a:prstGeom>
+        </p:spPr>
+        <p:style>
+          <a:lnRef idx="2">
+            <a:schemeClr val="accent1">
+              <a:shade val="50000"/>
+            </a:schemeClr>
+          </a:lnRef>
+          <a:fillRef idx="1">
+            <a:schemeClr val="accent1"/>
+          </a:fillRef>
+          <a:effectRef idx="0">
+            <a:schemeClr val="accent1"/>
+          </a:effectRef>
+          <a:fontRef idx="minor">
+            <a:schemeClr val="lt1"/>
+          </a:fontRef>
+        </p:style>
+        <p:txBody>
+          <a:bodyPr rtlCol="0" anchor="ctr"/>
+          <a:lstStyle/>
+          <a:p>
+            <a:pPr algn="ctr"/>
+            <a:r>
+              <a:rPr lang="en-US" sz="3200" dirty="0" err="1"/>
+              <a:t>qcustomplot</a:t>
+            </a:r>
+            <a:endParaRPr lang="ru-RU" sz="3200" dirty="0"/>
+          </a:p>
+        </p:txBody>
+      </p:sp>
+      <p:cxnSp>
+        <p:nvCxnSpPr>
+          <p:cNvPr id="10" name="Прямая со стрелкой 9">
+            <a:extLst>
+              <a:ext uri="{FF2B5EF4-FFF2-40B4-BE49-F238E27FC236}">
+                <a16:creationId xmlns:a16="http://schemas.microsoft.com/office/drawing/2014/main" id="{C23A590F-FDBE-4AD9-993E-B5D6A4BC3FC8}"/>
+              </a:ext>
+            </a:extLst>
+          </p:cNvPr>
+          <p:cNvCxnSpPr>
+            <a:stCxn id="5" idx="2"/>
+            <a:endCxn id="6" idx="0"/>
+          </p:cNvCxnSpPr>
+          <p:nvPr/>
+        </p:nvCxnSpPr>
+        <p:spPr>
+          <a:xfrm flipH="1">
+            <a:off x="7590183" y="3145941"/>
+            <a:ext cx="1" cy="566119"/>
+          </a:xfrm>
+          <a:prstGeom prst="straightConnector1">
+            <a:avLst/>
+          </a:prstGeom>
+          <a:ln w="57150">
+            <a:headEnd type="triangle"/>
+            <a:tailEnd type="triangle"/>
+          </a:ln>
+        </p:spPr>
+        <p:style>
+          <a:lnRef idx="1">
+            <a:schemeClr val="accent1"/>
+          </a:lnRef>
+          <a:fillRef idx="0">
+            <a:schemeClr val="accent1"/>
+          </a:fillRef>
+          <a:effectRef idx="0">
+            <a:schemeClr val="accent1"/>
+          </a:effectRef>
+          <a:fontRef idx="minor">
+            <a:schemeClr val="tx1"/>
+          </a:fontRef>
+        </p:style>
+      </p:cxnSp>
     </p:spTree>
     <p:extLst>
       <p:ext uri="{BB962C8B-B14F-4D97-AF65-F5344CB8AC3E}">
@@ -5534,11 +6090,15 @@
           <a:lstStyle/>
           <a:p>
             <a:r>
-              <a:rPr lang="en-US" dirty="0"/>
-              <a:t>UML - </a:t>
-            </a:r>
-            <a:r>
-              <a:rPr lang="ru-RU" dirty="0"/>
+              <a:rPr lang="en-US" dirty="0">
+                <a:latin typeface="Impact" panose="020B0806030902050204" pitchFamily="34" charset="0"/>
+              </a:rPr>
+              <a:t>UML-</a:t>
+            </a:r>
+            <a:r>
+              <a:rPr lang="ru-RU" dirty="0">
+                <a:latin typeface="Impact" panose="020B0806030902050204" pitchFamily="34" charset="0"/>
+              </a:rPr>
               <a:t>диаграмма</a:t>
             </a:r>
           </a:p>

</xml_diff>

<commit_message>
presentation improved, graphic added, video added
</commit_message>
<xml_diff>
--- a/presentation.pptx
+++ b/presentation.pptx
@@ -3782,10 +3782,10 @@
       </p:pic>
       <p:pic>
         <p:nvPicPr>
-          <p:cNvPr id="12" name="Рисунок 11">
-            <a:extLst>
-              <a:ext uri="{FF2B5EF4-FFF2-40B4-BE49-F238E27FC236}">
-                <a16:creationId xmlns:a16="http://schemas.microsoft.com/office/drawing/2014/main" id="{FD300778-E4F7-4A77-932C-8443C5FAD7B9}"/>
+          <p:cNvPr id="9" name="Рисунок 8">
+            <a:extLst>
+              <a:ext uri="{FF2B5EF4-FFF2-40B4-BE49-F238E27FC236}">
+                <a16:creationId xmlns:a16="http://schemas.microsoft.com/office/drawing/2014/main" id="{95CD4F8A-E099-464B-8D5A-B5EF9F52F5F1}"/>
               </a:ext>
             </a:extLst>
           </p:cNvPr>
@@ -3802,8 +3802,8 @@
         </p:blipFill>
         <p:spPr>
           <a:xfrm>
-            <a:off x="6273523" y="1543011"/>
-            <a:ext cx="5621008" cy="4991572"/>
+            <a:off x="6273521" y="1544196"/>
+            <a:ext cx="5568968" cy="4948679"/>
           </a:xfrm>
           <a:prstGeom prst="rect">
             <a:avLst/>

</xml_diff>